<commit_message>
Update Sentiment Analysis Presentation.pptx
</commit_message>
<xml_diff>
--- a/Amazon Review Sentiment Analysis/docs/Sentiment Analysis Presentation.pptx
+++ b/Amazon Review Sentiment Analysis/docs/Sentiment Analysis Presentation.pptx
@@ -120,6 +120,11 @@
       </a:defRPr>
     </a:lvl9pPr>
   </p:defaultTextStyle>
+  <p:extLst>
+    <p:ext uri="{EFAFB233-063F-42B5-8137-9DF3F51BA10A}">
+      <p15:sldGuideLst xmlns:p15="http://schemas.microsoft.com/office/powerpoint/2012/main"/>
+    </p:ext>
+  </p:extLst>
 </p:presentation>
 </file>
 
@@ -1335,8 +1340,8 @@
     <dgm:cxn modelId="{215D4D05-A22B-4A1D-9FDF-E3822D74DC66}" srcId="{5EC816E8-FC34-43F3-87FB-E7A77972063A}" destId="{54E0B4C0-8CEB-4818-8F07-61E19777C41E}" srcOrd="1" destOrd="0" parTransId="{E38FF7A3-49A5-48F2-957A-5E76886D2C83}" sibTransId="{FFE43035-BE06-47C9-9FC4-AB3467BC25FF}"/>
     <dgm:cxn modelId="{B8E52931-A000-4136-96F6-F3D6C86E5134}" type="presOf" srcId="{76737569-6CF0-490D-B5CC-013C118BE258}" destId="{B4F9716B-B13C-42C5-A9FC-DB16AA23106B}" srcOrd="0" destOrd="0" presId="urn:microsoft.com/office/officeart/2018/2/layout/IconVerticalSolidList"/>
     <dgm:cxn modelId="{7D2BED37-C241-4B22-B890-3714453629D0}" type="presOf" srcId="{54E0B4C0-8CEB-4818-8F07-61E19777C41E}" destId="{A921D19E-6405-4B8F-8310-915AF483B5C4}" srcOrd="0" destOrd="0" presId="urn:microsoft.com/office/officeart/2018/2/layout/IconVerticalSolidList"/>
+    <dgm:cxn modelId="{C453A068-1A17-41ED-A619-98C844489980}" srcId="{5EC816E8-FC34-43F3-87FB-E7A77972063A}" destId="{7A91E479-557B-4BDA-97C8-658726D63023}" srcOrd="0" destOrd="0" parTransId="{4808D35E-26BA-43A8-BAFE-9015BEDC416F}" sibTransId="{5881447F-5E00-459C-9E1E-B29F3AE35F03}"/>
     <dgm:cxn modelId="{BE6A355A-A689-4407-B859-96517D10E0E9}" srcId="{5EC816E8-FC34-43F3-87FB-E7A77972063A}" destId="{76737569-6CF0-490D-B5CC-013C118BE258}" srcOrd="2" destOrd="0" parTransId="{106AD73C-4250-4976-93E4-F059D4D326D4}" sibTransId="{40EBB9AF-9605-4139-ADBA-42C49C181EC6}"/>
-    <dgm:cxn modelId="{C453A068-1A17-41ED-A619-98C844489980}" srcId="{5EC816E8-FC34-43F3-87FB-E7A77972063A}" destId="{7A91E479-557B-4BDA-97C8-658726D63023}" srcOrd="0" destOrd="0" parTransId="{4808D35E-26BA-43A8-BAFE-9015BEDC416F}" sibTransId="{5881447F-5E00-459C-9E1E-B29F3AE35F03}"/>
     <dgm:cxn modelId="{8750CD86-F5D2-4ADE-89C8-1FEB198D2FE5}" type="presOf" srcId="{5EC816E8-FC34-43F3-87FB-E7A77972063A}" destId="{E10DE6FD-0886-41C0-8A29-A1D96237128C}" srcOrd="0" destOrd="0" presId="urn:microsoft.com/office/officeart/2018/2/layout/IconVerticalSolidList"/>
     <dgm:cxn modelId="{67D932C8-F7CA-4E10-89BF-F0AEB7B7A795}" type="presOf" srcId="{7A91E479-557B-4BDA-97C8-658726D63023}" destId="{45E238A4-65A3-4729-88BC-A01DFD9734B2}" srcOrd="0" destOrd="0" presId="urn:microsoft.com/office/officeart/2018/2/layout/IconVerticalSolidList"/>
     <dgm:cxn modelId="{A830CDF2-6789-40F8-B0AB-97DB7FE659D2}" type="presParOf" srcId="{E10DE6FD-0886-41C0-8A29-A1D96237128C}" destId="{249852F1-DFA1-45F8-B30D-4B22483AEF1F}" srcOrd="0" destOrd="0" presId="urn:microsoft.com/office/officeart/2018/2/layout/IconVerticalSolidList"/>
@@ -3245,7 +3250,7 @@
           <a:p>
             <a:fld id="{A81387AF-7257-2444-B3A1-54AC71D92323}" type="datetimeFigureOut">
               <a:rPr lang="en-US" smtClean="0"/>
-              <a:t>7/5/23</a:t>
+              <a:t>7/5/2023</a:t>
             </a:fld>
             <a:endParaRPr lang="en-US"/>
           </a:p>
@@ -3923,7 +3928,7 @@
           <a:p>
             <a:fld id="{5E7AA473-D82F-4EFF-9DF7-AE6D83C51288}" type="datetime1">
               <a:rPr lang="en-US" smtClean="0"/>
-              <a:t>7/5/23</a:t>
+              <a:t>7/5/2023</a:t>
             </a:fld>
             <a:endParaRPr lang="en-US"/>
           </a:p>
@@ -4177,7 +4182,7 @@
           <a:p>
             <a:fld id="{1E12F1F0-FE2D-4C1C-B320-8CB9BE735F0F}" type="datetime1">
               <a:rPr lang="en-US" smtClean="0"/>
-              <a:t>7/5/23</a:t>
+              <a:t>7/5/2023</a:t>
             </a:fld>
             <a:endParaRPr lang="en-US"/>
           </a:p>
@@ -4445,7 +4450,7 @@
           <a:p>
             <a:fld id="{2CF1B96C-10FD-4EBC-9029-9652B7535D02}" type="datetime1">
               <a:rPr lang="en-US" smtClean="0"/>
-              <a:t>7/5/23</a:t>
+              <a:t>7/5/2023</a:t>
             </a:fld>
             <a:endParaRPr lang="en-US"/>
           </a:p>
@@ -4699,7 +4704,7 @@
           <a:p>
             <a:fld id="{14878474-CC00-4A95-9D50-A41C12D1EEC4}" type="datetime1">
               <a:rPr lang="en-US" smtClean="0"/>
-              <a:t>7/5/23</a:t>
+              <a:t>7/5/2023</a:t>
             </a:fld>
             <a:endParaRPr lang="en-US"/>
           </a:p>
@@ -4977,7 +4982,7 @@
           <a:p>
             <a:fld id="{7F38C8B4-7FBB-408F-BDB9-F0496874AFB2}" type="datetime1">
               <a:rPr lang="en-US" smtClean="0"/>
-              <a:t>7/5/23</a:t>
+              <a:t>7/5/2023</a:t>
             </a:fld>
             <a:endParaRPr lang="en-US"/>
           </a:p>
@@ -5249,7 +5254,7 @@
           <a:p>
             <a:fld id="{2BB8EE20-A5E2-47D3-8F6D-A2BA7AB2E093}" type="datetime1">
               <a:rPr lang="en-US" smtClean="0"/>
-              <a:t>7/5/23</a:t>
+              <a:t>7/5/2023</a:t>
             </a:fld>
             <a:endParaRPr lang="en-US"/>
           </a:p>
@@ -5807,7 +5812,7 @@
           <a:p>
             <a:fld id="{3382CF99-132F-413F-B7EF-71A5C33F2ED6}" type="datetime1">
               <a:rPr lang="en-US" smtClean="0"/>
-              <a:t>7/5/23</a:t>
+              <a:t>7/5/2023</a:t>
             </a:fld>
             <a:endParaRPr lang="en-US"/>
           </a:p>
@@ -5949,7 +5954,7 @@
           <a:p>
             <a:fld id="{1F17AE06-98E0-4D9F-A059-92C3548821BB}" type="datetime1">
               <a:rPr lang="en-US" smtClean="0"/>
-              <a:t>7/5/23</a:t>
+              <a:t>7/5/2023</a:t>
             </a:fld>
             <a:endParaRPr lang="en-US"/>
           </a:p>
@@ -6062,7 +6067,7 @@
           <a:p>
             <a:fld id="{FFBA00CA-3DDC-4705-B840-978EF5EA0707}" type="datetime1">
               <a:rPr lang="en-US" smtClean="0"/>
-              <a:t>7/5/23</a:t>
+              <a:t>7/5/2023</a:t>
             </a:fld>
             <a:endParaRPr lang="en-US"/>
           </a:p>
@@ -6381,7 +6386,7 @@
           <a:p>
             <a:fld id="{FC366D49-0BBA-4C5A-AD96-6448CA63451A}" type="datetime1">
               <a:rPr lang="en-US" smtClean="0"/>
-              <a:t>7/5/23</a:t>
+              <a:t>7/5/2023</a:t>
             </a:fld>
             <a:endParaRPr lang="en-US"/>
           </a:p>
@@ -6678,7 +6683,7 @@
           <a:p>
             <a:fld id="{4F4EB293-A316-472D-A8B4-6947CF1A12B7}" type="datetime1">
               <a:rPr lang="en-US" smtClean="0"/>
-              <a:t>7/5/23</a:t>
+              <a:t>7/5/2023</a:t>
             </a:fld>
             <a:endParaRPr lang="en-US"/>
           </a:p>
@@ -6957,7 +6962,7 @@
           <a:p>
             <a:fld id="{734BCCD4-CEB1-405B-A443-DD9CBCBEA552}" type="datetime1">
               <a:rPr lang="en-US" smtClean="0"/>
-              <a:t>7/5/23</a:t>
+              <a:t>7/5/2023</a:t>
             </a:fld>
             <a:endParaRPr lang="en-US"/>
           </a:p>
@@ -7620,7 +7625,7 @@
               </a:lnSpc>
             </a:pPr>
             <a:r>
-              <a:rPr lang="en-US" sz="4200">
+              <a:rPr lang="en-US" sz="4200" dirty="0">
                 <a:solidFill>
                   <a:srgbClr val="FFFFFF"/>
                 </a:solidFill>
@@ -8222,7 +8227,35 @@
           <a:bodyPr/>
           <a:lstStyle/>
           <a:p>
-            <a:endParaRPr lang="en-US"/>
+            <a:pPr marL="285750" indent="-285750">
+              <a:buFont typeface="Arial" panose="020B0604020202020204" pitchFamily="34" charset="0"/>
+              <a:buChar char="•"/>
+            </a:pPr>
+            <a:r>
+              <a:rPr lang="en-US" sz="1800" b="0" i="0" u="none" strike="noStrike" baseline="0" dirty="0">
+                <a:solidFill>
+                  <a:srgbClr val="000000"/>
+                </a:solidFill>
+                <a:latin typeface="Calibri" panose="020F0502020204030204" pitchFamily="34" charset="0"/>
+              </a:rPr>
+              <a:t>Based on the results, it is recommended to further explore the Logistic Regression model for sentiment analysis on customer reviews.</a:t>
+            </a:r>
+          </a:p>
+          <a:p>
+            <a:pPr marL="285750" indent="-285750">
+              <a:buFont typeface="Arial" panose="020B0604020202020204" pitchFamily="34" charset="0"/>
+              <a:buChar char="•"/>
+            </a:pPr>
+            <a:r>
+              <a:rPr lang="en-US" sz="1800" b="0" i="0" u="none" strike="noStrike" baseline="0" dirty="0">
+                <a:solidFill>
+                  <a:srgbClr val="000000"/>
+                </a:solidFill>
+                <a:latin typeface="Calibri" panose="020F0502020204030204" pitchFamily="34" charset="0"/>
+              </a:rPr>
+              <a:t> Additionally, additional features or techniques such as word embeddings or deep learning models like Recurrent Neural Networks (RNNs) can be explored to enhance the accuracy and performance of sentiment classification. </a:t>
+            </a:r>
+            <a:endParaRPr lang="en-US" dirty="0"/>
           </a:p>
         </p:txBody>
       </p:sp>
@@ -8305,7 +8338,50 @@
           <a:bodyPr/>
           <a:lstStyle/>
           <a:p>
-            <a:endParaRPr lang="en-US"/>
+            <a:pPr marL="285750" indent="-285750">
+              <a:buFont typeface="Arial" panose="020B0604020202020204" pitchFamily="34" charset="0"/>
+              <a:buChar char="•"/>
+            </a:pPr>
+            <a:r>
+              <a:rPr lang="en-US" sz="1800" b="0" i="0" u="none" strike="noStrike" baseline="0" dirty="0">
+                <a:solidFill>
+                  <a:srgbClr val="000000"/>
+                </a:solidFill>
+                <a:latin typeface="Calibri" panose="020F0502020204030204" pitchFamily="34" charset="0"/>
+              </a:rPr>
+              <a:t>It is important to note that the accuracy and performance of the models may vary depending on the dataset and domain. </a:t>
+            </a:r>
+          </a:p>
+          <a:p>
+            <a:pPr marL="285750" indent="-285750">
+              <a:buFont typeface="Arial" panose="020B0604020202020204" pitchFamily="34" charset="0"/>
+              <a:buChar char="•"/>
+            </a:pPr>
+            <a:r>
+              <a:rPr lang="en-US" sz="1800" b="0" i="0" u="none" strike="noStrike" baseline="0" dirty="0">
+                <a:solidFill>
+                  <a:srgbClr val="000000"/>
+                </a:solidFill>
+                <a:latin typeface="Calibri" panose="020F0502020204030204" pitchFamily="34" charset="0"/>
+              </a:rPr>
+              <a:t>The results obtained in this analysis are specific to the provided dataset and may not generalize to other contexts.</a:t>
+            </a:r>
+          </a:p>
+          <a:p>
+            <a:pPr marL="285750" indent="-285750">
+              <a:buFont typeface="Arial" panose="020B0604020202020204" pitchFamily="34" charset="0"/>
+              <a:buChar char="•"/>
+            </a:pPr>
+            <a:r>
+              <a:rPr lang="en-US" sz="1800" b="0" i="0" u="none" strike="noStrike" baseline="0" dirty="0">
+                <a:solidFill>
+                  <a:srgbClr val="000000"/>
+                </a:solidFill>
+                <a:latin typeface="Calibri" panose="020F0502020204030204" pitchFamily="34" charset="0"/>
+              </a:rPr>
+              <a:t> Further experimentation and evaluation on diverse datasets are recommended to validate the findings. </a:t>
+            </a:r>
+            <a:endParaRPr lang="en-US" dirty="0"/>
           </a:p>
         </p:txBody>
       </p:sp>
@@ -8393,8 +8469,13 @@
               <a:buChar char="•"/>
             </a:pPr>
             <a:r>
-              <a:rPr lang="en-US" dirty="0"/>
-              <a:t>Based on the results returned by both all three machine learning models across two vectorization methods, Count-Vector and Logistic Regression are the best fit for the purpose of this analysis</a:t>
+              <a:rPr lang="en-US" sz="1800" b="0" i="0" u="none" strike="noStrike" baseline="0" dirty="0">
+                <a:solidFill>
+                  <a:srgbClr val="000000"/>
+                </a:solidFill>
+                <a:latin typeface="Calibri" panose="020F0502020204030204" pitchFamily="34" charset="0"/>
+              </a:rPr>
+              <a:t>In conclusion, sentiment analysis on customer reviews using machine learning models proved to be effective in classifying customer sentiments. </a:t>
             </a:r>
           </a:p>
           <a:p>
@@ -8402,6 +8483,30 @@
               <a:buFont typeface="Arial" panose="020B0604020202020204" pitchFamily="34" charset="0"/>
               <a:buChar char="•"/>
             </a:pPr>
+            <a:r>
+              <a:rPr lang="en-US" sz="1800" b="0" i="0" u="none" strike="noStrike" baseline="0" dirty="0">
+                <a:solidFill>
+                  <a:srgbClr val="000000"/>
+                </a:solidFill>
+                <a:latin typeface="Calibri" panose="020F0502020204030204" pitchFamily="34" charset="0"/>
+              </a:rPr>
+              <a:t>The Logistic Regression model for the Count-Vector method demonstrated the highest performance among the models evaluated, with the highest precision and F1 score. </a:t>
+            </a:r>
+          </a:p>
+          <a:p>
+            <a:pPr marL="342900" indent="-342900">
+              <a:buFont typeface="Arial" panose="020B0604020202020204" pitchFamily="34" charset="0"/>
+              <a:buChar char="•"/>
+            </a:pPr>
+            <a:r>
+              <a:rPr lang="en-US" sz="1800" b="0" i="0" u="none" strike="noStrike" baseline="0" dirty="0">
+                <a:solidFill>
+                  <a:srgbClr val="000000"/>
+                </a:solidFill>
+                <a:latin typeface="Calibri" panose="020F0502020204030204" pitchFamily="34" charset="0"/>
+              </a:rPr>
+              <a:t>These findings can assist the business in understanding customer sentiments and making informed decisions based on customer feedback </a:t>
+            </a:r>
             <a:endParaRPr lang="en-US" dirty="0"/>
           </a:p>
         </p:txBody>

</xml_diff>